<commit_message>
Added git clone repository instruction
</commit_message>
<xml_diff>
--- a/lectures/powerpoints/Accessing CS-2.pptx
+++ b/lectures/powerpoints/Accessing CS-2.pptx
@@ -13,7 +13,7 @@
   <p:sldIdLst>
     <p:sldId id="286" r:id="rId2"/>
     <p:sldId id="288" r:id="rId3"/>
-    <p:sldId id="287" r:id="rId4"/>
+    <p:sldId id="289" r:id="rId4"/>
   </p:sldIdLst>
   <p:sldSz cx="12192000" cy="6858000"/>
   <p:notesSz cx="6858000" cy="9144000"/>
@@ -199,7 +199,7 @@
           <a:p>
             <a:fld id="{237A3326-6BE8-4DE2-A526-66D6DC5DC342}" type="datetimeFigureOut">
               <a:rPr lang="en-GB" smtClean="0"/>
-              <a:t>19/12/2023</a:t>
+              <a:t>01/05/2024</a:t>
             </a:fld>
             <a:endParaRPr lang="en-GB"/>
           </a:p>
@@ -376,7 +376,7 @@
           <a:p>
             <a:fld id="{198E9702-0021-4473-93B9-41638846F4C4}" type="datetimeFigureOut">
               <a:rPr lang="en-GB" smtClean="0"/>
-              <a:t>19/12/2023</a:t>
+              <a:t>01/05/2024</a:t>
             </a:fld>
             <a:endParaRPr lang="en-GB"/>
           </a:p>
@@ -888,7 +888,7 @@
           <a:p>
             <a:fld id="{B1836D41-3C4D-1D49-AA54-4231464E6415}" type="datetimeFigureOut">
               <a:rPr lang="en-US" smtClean="0"/>
-              <a:t>12/19/2023</a:t>
+              <a:t>5/1/24</a:t>
             </a:fld>
             <a:endParaRPr lang="en-US"/>
           </a:p>
@@ -1092,7 +1092,7 @@
           <a:p>
             <a:fld id="{B1836D41-3C4D-1D49-AA54-4231464E6415}" type="datetimeFigureOut">
               <a:rPr lang="en-US" smtClean="0"/>
-              <a:t>12/19/2023</a:t>
+              <a:t>5/1/24</a:t>
             </a:fld>
             <a:endParaRPr lang="en-US"/>
           </a:p>
@@ -1273,7 +1273,7 @@
           <a:p>
             <a:fld id="{B1836D41-3C4D-1D49-AA54-4231464E6415}" type="datetimeFigureOut">
               <a:rPr lang="en-US" smtClean="0"/>
-              <a:t>12/19/2023</a:t>
+              <a:t>5/1/24</a:t>
             </a:fld>
             <a:endParaRPr lang="en-US"/>
           </a:p>
@@ -1448,7 +1448,7 @@
           <a:p>
             <a:fld id="{B1836D41-3C4D-1D49-AA54-4231464E6415}" type="datetimeFigureOut">
               <a:rPr lang="en-US" smtClean="0"/>
-              <a:t>12/19/2023</a:t>
+              <a:t>5/1/24</a:t>
             </a:fld>
             <a:endParaRPr lang="en-US"/>
           </a:p>
@@ -1696,7 +1696,7 @@
           <a:p>
             <a:fld id="{B1836D41-3C4D-1D49-AA54-4231464E6415}" type="datetimeFigureOut">
               <a:rPr lang="en-US" smtClean="0"/>
-              <a:t>12/19/2023</a:t>
+              <a:t>5/1/24</a:t>
             </a:fld>
             <a:endParaRPr lang="en-US"/>
           </a:p>
@@ -2013,7 +2013,7 @@
           <a:p>
             <a:fld id="{B1836D41-3C4D-1D49-AA54-4231464E6415}" type="datetimeFigureOut">
               <a:rPr lang="en-US" smtClean="0"/>
-              <a:t>12/19/2023</a:t>
+              <a:t>5/1/24</a:t>
             </a:fld>
             <a:endParaRPr lang="en-US"/>
           </a:p>
@@ -2479,7 +2479,7 @@
           <a:p>
             <a:fld id="{B1836D41-3C4D-1D49-AA54-4231464E6415}" type="datetimeFigureOut">
               <a:rPr lang="en-US" smtClean="0"/>
-              <a:t>12/19/2023</a:t>
+              <a:t>5/1/24</a:t>
             </a:fld>
             <a:endParaRPr lang="en-US"/>
           </a:p>
@@ -2626,7 +2626,7 @@
           <a:p>
             <a:fld id="{B1836D41-3C4D-1D49-AA54-4231464E6415}" type="datetimeFigureOut">
               <a:rPr lang="en-US" smtClean="0"/>
-              <a:t>12/19/2023</a:t>
+              <a:t>5/1/24</a:t>
             </a:fld>
             <a:endParaRPr lang="en-US"/>
           </a:p>
@@ -2716,7 +2716,7 @@
           <a:p>
             <a:fld id="{B1836D41-3C4D-1D49-AA54-4231464E6415}" type="datetimeFigureOut">
               <a:rPr lang="en-US" smtClean="0"/>
-              <a:t>12/19/2023</a:t>
+              <a:t>5/1/24</a:t>
             </a:fld>
             <a:endParaRPr lang="en-US"/>
           </a:p>
@@ -2990,7 +2990,7 @@
           <a:p>
             <a:fld id="{B1836D41-3C4D-1D49-AA54-4231464E6415}" type="datetimeFigureOut">
               <a:rPr lang="en-US" smtClean="0"/>
-              <a:t>12/19/2023</a:t>
+              <a:t>5/1/24</a:t>
             </a:fld>
             <a:endParaRPr lang="en-US"/>
           </a:p>
@@ -3295,7 +3295,7 @@
           <a:p>
             <a:fld id="{B1836D41-3C4D-1D49-AA54-4231464E6415}" type="datetimeFigureOut">
               <a:rPr lang="en-US" smtClean="0"/>
-              <a:t>12/19/2023</a:t>
+              <a:t>5/1/24</a:t>
             </a:fld>
             <a:endParaRPr lang="en-US"/>
           </a:p>
@@ -3592,7 +3592,7 @@
           <a:p>
             <a:fld id="{B1836D41-3C4D-1D49-AA54-4231464E6415}" type="datetimeFigureOut">
               <a:rPr lang="en-US" smtClean="0"/>
-              <a:t>12/19/2023</a:t>
+              <a:t>5/1/24</a:t>
             </a:fld>
             <a:endParaRPr lang="en-US"/>
           </a:p>
@@ -4486,7 +4486,7 @@
         </p:nvSpPr>
         <p:spPr>
           <a:xfrm>
-            <a:off x="609600" y="3240869"/>
+            <a:off x="609600" y="3021858"/>
             <a:ext cx="10972800" cy="1302998"/>
           </a:xfrm>
           <a:prstGeom prst="rect">
@@ -4674,23 +4674,7 @@
           <a:p>
             <a:r>
               <a:rPr lang="en-GB" dirty="0"/>
-              <a:t>Step two – cd into the </a:t>
-            </a:r>
-            <a:r>
-              <a:rPr lang="en-GB" i="1" dirty="0"/>
-              <a:t>cs2-sdk-training/</a:t>
-            </a:r>
-            <a:r>
-              <a:rPr lang="en-GB" i="1" dirty="0" err="1"/>
-              <a:t>practicals</a:t>
-            </a:r>
-            <a:r>
-              <a:rPr lang="en-GB" i="1" dirty="0"/>
-              <a:t>/walk-through </a:t>
-            </a:r>
-            <a:r>
-              <a:rPr lang="en-GB" dirty="0"/>
-              <a:t>which we will be working in for the next part of the tutorial</a:t>
+              <a:t>Step two – clone the tutorial repository</a:t>
             </a:r>
             <a:endParaRPr lang="en-GB" i="1" dirty="0"/>
           </a:p>
@@ -4710,7 +4694,7 @@
         </p:nvSpPr>
         <p:spPr>
           <a:xfrm>
-            <a:off x="609600" y="4662527"/>
+            <a:off x="609600" y="5313635"/>
             <a:ext cx="10972800" cy="1077218"/>
           </a:xfrm>
           <a:prstGeom prst="rect">
@@ -4809,7 +4793,7 @@
         </p:nvSpPr>
         <p:spPr>
           <a:xfrm>
-            <a:off x="695400" y="5965525"/>
+            <a:off x="609600" y="6450047"/>
             <a:ext cx="10225136" cy="369332"/>
           </a:xfrm>
           <a:prstGeom prst="rect">
@@ -4835,10 +4819,313 @@
           </a:p>
         </p:txBody>
       </p:sp>
+      <p:sp>
+        <p:nvSpPr>
+          <p:cNvPr id="8" name="Content Placeholder 2">
+            <a:extLst>
+              <a:ext uri="{FF2B5EF4-FFF2-40B4-BE49-F238E27FC236}">
+                <a16:creationId xmlns:a16="http://schemas.microsoft.com/office/drawing/2014/main" id="{41E8AF73-0859-54D6-56CF-A04AB321E9B7}"/>
+              </a:ext>
+            </a:extLst>
+          </p:cNvPr>
+          <p:cNvSpPr txBox="1">
+            <a:spLocks/>
+          </p:cNvSpPr>
+          <p:nvPr/>
+        </p:nvSpPr>
+        <p:spPr>
+          <a:xfrm>
+            <a:off x="609600" y="4410836"/>
+            <a:ext cx="10972800" cy="1302998"/>
+          </a:xfrm>
+          <a:prstGeom prst="rect">
+            <a:avLst/>
+          </a:prstGeom>
+        </p:spPr>
+        <p:txBody>
+          <a:bodyPr vert="horz" lIns="91440" tIns="45720" rIns="91440" bIns="45720" rtlCol="0">
+            <a:normAutofit/>
+          </a:bodyPr>
+          <a:lstStyle>
+            <a:lvl1pPr marL="182880" indent="-182880" algn="l" defTabSz="914400" rtl="0" eaLnBrk="1" latinLnBrk="0" hangingPunct="1">
+              <a:spcBef>
+                <a:spcPct val="20000"/>
+              </a:spcBef>
+              <a:buClr>
+                <a:schemeClr val="accent1"/>
+              </a:buClr>
+              <a:buSzPct val="85000"/>
+              <a:buFont typeface="Arial" pitchFamily="34" charset="0"/>
+              <a:buChar char="•"/>
+              <a:defRPr sz="2400" kern="1200">
+                <a:solidFill>
+                  <a:schemeClr val="tx1"/>
+                </a:solidFill>
+                <a:latin typeface="+mn-lt"/>
+                <a:ea typeface="+mn-ea"/>
+                <a:cs typeface="+mn-cs"/>
+              </a:defRPr>
+            </a:lvl1pPr>
+            <a:lvl2pPr marL="457200" indent="-182880" algn="l" defTabSz="914400" rtl="0" eaLnBrk="1" latinLnBrk="0" hangingPunct="1">
+              <a:spcBef>
+                <a:spcPct val="20000"/>
+              </a:spcBef>
+              <a:buClr>
+                <a:schemeClr val="accent1"/>
+              </a:buClr>
+              <a:buSzPct val="85000"/>
+              <a:buFont typeface="Arial" pitchFamily="34" charset="0"/>
+              <a:buChar char="•"/>
+              <a:defRPr sz="2000" kern="1200">
+                <a:solidFill>
+                  <a:schemeClr val="tx1"/>
+                </a:solidFill>
+                <a:latin typeface="+mn-lt"/>
+                <a:ea typeface="+mn-ea"/>
+                <a:cs typeface="+mn-cs"/>
+              </a:defRPr>
+            </a:lvl2pPr>
+            <a:lvl3pPr marL="731520" indent="-182880" algn="l" defTabSz="914400" rtl="0" eaLnBrk="1" latinLnBrk="0" hangingPunct="1">
+              <a:spcBef>
+                <a:spcPct val="20000"/>
+              </a:spcBef>
+              <a:buClr>
+                <a:schemeClr val="accent1"/>
+              </a:buClr>
+              <a:buSzPct val="90000"/>
+              <a:buFont typeface="Arial" pitchFamily="34" charset="0"/>
+              <a:buChar char="•"/>
+              <a:defRPr sz="1800" kern="1200">
+                <a:solidFill>
+                  <a:schemeClr val="tx1"/>
+                </a:solidFill>
+                <a:latin typeface="+mn-lt"/>
+                <a:ea typeface="+mn-ea"/>
+                <a:cs typeface="+mn-cs"/>
+              </a:defRPr>
+            </a:lvl3pPr>
+            <a:lvl4pPr marL="1005840" indent="-182880" algn="l" defTabSz="914400" rtl="0" eaLnBrk="1" latinLnBrk="0" hangingPunct="1">
+              <a:spcBef>
+                <a:spcPct val="20000"/>
+              </a:spcBef>
+              <a:buClr>
+                <a:schemeClr val="accent1"/>
+              </a:buClr>
+              <a:buFont typeface="Arial" pitchFamily="34" charset="0"/>
+              <a:buChar char="•"/>
+              <a:defRPr sz="1600" kern="1200">
+                <a:solidFill>
+                  <a:schemeClr val="tx1"/>
+                </a:solidFill>
+                <a:latin typeface="+mn-lt"/>
+                <a:ea typeface="+mn-ea"/>
+                <a:cs typeface="+mn-cs"/>
+              </a:defRPr>
+            </a:lvl4pPr>
+            <a:lvl5pPr marL="1188720" indent="-137160" algn="l" defTabSz="914400" rtl="0" eaLnBrk="1" latinLnBrk="0" hangingPunct="1">
+              <a:spcBef>
+                <a:spcPct val="20000"/>
+              </a:spcBef>
+              <a:buClr>
+                <a:schemeClr val="accent1"/>
+              </a:buClr>
+              <a:buSzPct val="100000"/>
+              <a:buFont typeface="Arial" pitchFamily="34" charset="0"/>
+              <a:buChar char="•"/>
+              <a:defRPr sz="1400" kern="1200" baseline="0">
+                <a:solidFill>
+                  <a:schemeClr val="tx1"/>
+                </a:solidFill>
+                <a:latin typeface="+mn-lt"/>
+                <a:ea typeface="+mn-ea"/>
+                <a:cs typeface="+mn-cs"/>
+              </a:defRPr>
+            </a:lvl5pPr>
+            <a:lvl6pPr marL="1371600" indent="-182880" algn="l" defTabSz="914400" rtl="0" eaLnBrk="1" latinLnBrk="0" hangingPunct="1">
+              <a:spcBef>
+                <a:spcPct val="20000"/>
+              </a:spcBef>
+              <a:buClr>
+                <a:schemeClr val="accent1"/>
+              </a:buClr>
+              <a:buFont typeface="Arial" pitchFamily="34" charset="0"/>
+              <a:buChar char="•"/>
+              <a:defRPr sz="1300" kern="1200">
+                <a:solidFill>
+                  <a:schemeClr val="tx1"/>
+                </a:solidFill>
+                <a:latin typeface="+mn-lt"/>
+                <a:ea typeface="+mn-ea"/>
+                <a:cs typeface="+mn-cs"/>
+              </a:defRPr>
+            </a:lvl6pPr>
+            <a:lvl7pPr marL="1554480" indent="-182880" algn="l" defTabSz="914400" rtl="0" eaLnBrk="1" latinLnBrk="0" hangingPunct="1">
+              <a:spcBef>
+                <a:spcPct val="20000"/>
+              </a:spcBef>
+              <a:buClr>
+                <a:schemeClr val="accent1"/>
+              </a:buClr>
+              <a:buFont typeface="Arial" pitchFamily="34" charset="0"/>
+              <a:buChar char="•"/>
+              <a:defRPr sz="1300" kern="1200">
+                <a:solidFill>
+                  <a:schemeClr val="tx1"/>
+                </a:solidFill>
+                <a:latin typeface="+mn-lt"/>
+                <a:ea typeface="+mn-ea"/>
+                <a:cs typeface="+mn-cs"/>
+              </a:defRPr>
+            </a:lvl7pPr>
+            <a:lvl8pPr marL="1737360" indent="-182880" algn="l" defTabSz="914400" rtl="0" eaLnBrk="1" latinLnBrk="0" hangingPunct="1">
+              <a:spcBef>
+                <a:spcPct val="20000"/>
+              </a:spcBef>
+              <a:buClr>
+                <a:schemeClr val="accent1"/>
+              </a:buClr>
+              <a:buFont typeface="Arial" pitchFamily="34" charset="0"/>
+              <a:buChar char="•"/>
+              <a:defRPr sz="1300" kern="1200">
+                <a:solidFill>
+                  <a:schemeClr val="tx1"/>
+                </a:solidFill>
+                <a:latin typeface="+mn-lt"/>
+                <a:ea typeface="+mn-ea"/>
+                <a:cs typeface="+mn-cs"/>
+              </a:defRPr>
+            </a:lvl8pPr>
+            <a:lvl9pPr marL="1920240" indent="-182880" algn="l" defTabSz="914400" rtl="0" eaLnBrk="1" latinLnBrk="0" hangingPunct="1">
+              <a:spcBef>
+                <a:spcPct val="20000"/>
+              </a:spcBef>
+              <a:buClr>
+                <a:schemeClr val="accent1"/>
+              </a:buClr>
+              <a:buFont typeface="Arial" pitchFamily="34" charset="0"/>
+              <a:buChar char="•"/>
+              <a:defRPr sz="1300" kern="1200">
+                <a:solidFill>
+                  <a:schemeClr val="tx1"/>
+                </a:solidFill>
+                <a:latin typeface="+mn-lt"/>
+                <a:ea typeface="+mn-ea"/>
+                <a:cs typeface="+mn-cs"/>
+              </a:defRPr>
+            </a:lvl9pPr>
+          </a:lstStyle>
+          <a:p>
+            <a:r>
+              <a:rPr lang="en-GB" dirty="0"/>
+              <a:t>Step three – cd into the </a:t>
+            </a:r>
+            <a:r>
+              <a:rPr lang="en-GB" i="1" dirty="0"/>
+              <a:t>cs2-sdk-training/</a:t>
+            </a:r>
+            <a:r>
+              <a:rPr lang="en-GB" i="1" dirty="0" err="1"/>
+              <a:t>practicals</a:t>
+            </a:r>
+            <a:r>
+              <a:rPr lang="en-GB" i="1" dirty="0"/>
+              <a:t>/walk-through </a:t>
+            </a:r>
+            <a:r>
+              <a:rPr lang="en-GB" dirty="0"/>
+              <a:t>which we will be working in for the next part of the tutorial</a:t>
+            </a:r>
+            <a:endParaRPr lang="en-GB" i="1" dirty="0"/>
+          </a:p>
+        </p:txBody>
+      </p:sp>
+      <p:sp>
+        <p:nvSpPr>
+          <p:cNvPr id="9" name="TextBox 8">
+            <a:extLst>
+              <a:ext uri="{FF2B5EF4-FFF2-40B4-BE49-F238E27FC236}">
+                <a16:creationId xmlns:a16="http://schemas.microsoft.com/office/drawing/2014/main" id="{9622E17D-25B4-644B-85D8-2BFEE4B4BCD7}"/>
+              </a:ext>
+            </a:extLst>
+          </p:cNvPr>
+          <p:cNvSpPr txBox="1"/>
+          <p:nvPr/>
+        </p:nvSpPr>
+        <p:spPr>
+          <a:xfrm>
+            <a:off x="609600" y="4026550"/>
+            <a:ext cx="10972800" cy="338554"/>
+          </a:xfrm>
+          <a:prstGeom prst="rect">
+            <a:avLst/>
+          </a:prstGeom>
+          <a:solidFill>
+            <a:schemeClr val="tx1"/>
+          </a:solidFill>
+        </p:spPr>
+        <p:txBody>
+          <a:bodyPr wrap="square" rtlCol="0">
+            <a:spAutoFit/>
+          </a:bodyPr>
+          <a:lstStyle/>
+          <a:p>
+            <a:r>
+              <a:rPr lang="en-GB" sz="1600" dirty="0">
+                <a:solidFill>
+                  <a:schemeClr val="bg1"/>
+                </a:solidFill>
+                <a:latin typeface="Courier New" panose="02070309020205020404" pitchFamily="49" charset="0"/>
+                <a:cs typeface="Courier New" panose="02070309020205020404" pitchFamily="49" charset="0"/>
+              </a:rPr>
+              <a:t>git clone https://</a:t>
+            </a:r>
+            <a:r>
+              <a:rPr lang="en-GB" sz="1600" dirty="0" err="1">
+                <a:solidFill>
+                  <a:schemeClr val="bg1"/>
+                </a:solidFill>
+                <a:latin typeface="Courier New" panose="02070309020205020404" pitchFamily="49" charset="0"/>
+                <a:cs typeface="Courier New" panose="02070309020205020404" pitchFamily="49" charset="0"/>
+              </a:rPr>
+              <a:t>github.com</a:t>
+            </a:r>
+            <a:r>
+              <a:rPr lang="en-GB" sz="1600" dirty="0">
+                <a:solidFill>
+                  <a:schemeClr val="bg1"/>
+                </a:solidFill>
+                <a:latin typeface="Courier New" panose="02070309020205020404" pitchFamily="49" charset="0"/>
+                <a:cs typeface="Courier New" panose="02070309020205020404" pitchFamily="49" charset="0"/>
+              </a:rPr>
+              <a:t>/</a:t>
+            </a:r>
+            <a:r>
+              <a:rPr lang="en-GB" sz="1600" dirty="0" err="1">
+                <a:solidFill>
+                  <a:schemeClr val="bg1"/>
+                </a:solidFill>
+                <a:latin typeface="Courier New" panose="02070309020205020404" pitchFamily="49" charset="0"/>
+                <a:cs typeface="Courier New" panose="02070309020205020404" pitchFamily="49" charset="0"/>
+              </a:rPr>
+              <a:t>EPCCed</a:t>
+            </a:r>
+            <a:r>
+              <a:rPr lang="en-GB" sz="1600" dirty="0">
+                <a:solidFill>
+                  <a:schemeClr val="bg1"/>
+                </a:solidFill>
+                <a:latin typeface="Courier New" panose="02070309020205020404" pitchFamily="49" charset="0"/>
+                <a:cs typeface="Courier New" panose="02070309020205020404" pitchFamily="49" charset="0"/>
+              </a:rPr>
+              <a:t>/cs2-sdk-training.git</a:t>
+            </a:r>
+          </a:p>
+        </p:txBody>
+      </p:sp>
     </p:spTree>
     <p:extLst>
       <p:ext uri="{BB962C8B-B14F-4D97-AF65-F5344CB8AC3E}">
-        <p14:creationId xmlns:p14="http://schemas.microsoft.com/office/powerpoint/2010/main" val="965051851"/>
+        <p14:creationId xmlns:p14="http://schemas.microsoft.com/office/powerpoint/2010/main" val="3712923087"/>
       </p:ext>
     </p:extLst>
   </p:cSld>

</xml_diff>